<commit_message>
updated pbix dashboard 12122025
</commit_message>
<xml_diff>
--- a/reports/PowerBI/HeMAB_QA_Dashboard_Latest.pptx
+++ b/reports/PowerBI/HeMAB_QA_Dashboard_Latest.pptx
@@ -6355,7 +6355,7 @@
                 <a:ea typeface="Segoe UI" charset="0"/>
                 <a:cs typeface="Segoe UI" charset="0"/>
               </a:rPr>
-              <a:t>12/12/2025 3:27:07 PM UTC</a:t>
+              <a:t>12/12/2025 11:36:24 PM UTC</a:t>
             </a:r>
           </a:p>
         </p:txBody>
@@ -6412,7 +6412,7 @@
                 <a:ea typeface="Segoe UI" charset="0"/>
                 <a:cs typeface="Segoe UI" charset="0"/>
               </a:rPr>
-              <a:t>12/12/2025 3:06:02 PM UTC</a:t>
+              <a:t>12/12/2025 11:32:17 PM UTC</a:t>
             </a:r>
             <a:endParaRPr lang="en-US" sz="900" b="0" i="0" dirty="0">
               <a:solidFill>
@@ -6525,7 +6525,7 @@
           <p:nvPr/>
         </p:nvPicPr>
         <p:blipFill>
-          <a:blip xmlns:r="http://schemas.openxmlformats.org/officeDocument/2006/relationships" xmlns:a="http://schemas.openxmlformats.org/drawingml/2006/main" r:embed="imgId44303175"/>
+          <a:blip xmlns:r="http://schemas.openxmlformats.org/officeDocument/2006/relationships" xmlns:a="http://schemas.openxmlformats.org/drawingml/2006/main" r:embed="imgId44310877"/>
           <a:stretch xmlns:a="http://schemas.openxmlformats.org/drawingml/2006/main">
             <a:fillRect/>
           </a:stretch>
@@ -6591,7 +6591,7 @@
           <p:nvPr/>
         </p:nvPicPr>
         <p:blipFill>
-          <a:blip xmlns:r="http://schemas.openxmlformats.org/officeDocument/2006/relationships" xmlns:a="http://schemas.openxmlformats.org/drawingml/2006/main" r:embed="imgId44303176"/>
+          <a:blip xmlns:r="http://schemas.openxmlformats.org/officeDocument/2006/relationships" xmlns:a="http://schemas.openxmlformats.org/drawingml/2006/main" r:embed="imgId44310878"/>
           <a:stretch xmlns:a="http://schemas.openxmlformats.org/drawingml/2006/main">
             <a:fillRect/>
           </a:stretch>
@@ -6657,7 +6657,7 @@
           <p:nvPr/>
         </p:nvPicPr>
         <p:blipFill>
-          <a:blip xmlns:r="http://schemas.openxmlformats.org/officeDocument/2006/relationships" xmlns:a="http://schemas.openxmlformats.org/drawingml/2006/main" r:embed="imgId44303177"/>
+          <a:blip xmlns:r="http://schemas.openxmlformats.org/officeDocument/2006/relationships" xmlns:a="http://schemas.openxmlformats.org/drawingml/2006/main" r:embed="imgId44310879"/>
           <a:stretch xmlns:a="http://schemas.openxmlformats.org/drawingml/2006/main">
             <a:fillRect/>
           </a:stretch>
@@ -6723,7 +6723,7 @@
           <p:nvPr/>
         </p:nvPicPr>
         <p:blipFill>
-          <a:blip xmlns:r="http://schemas.openxmlformats.org/officeDocument/2006/relationships" xmlns:a="http://schemas.openxmlformats.org/drawingml/2006/main" r:embed="imgId44303178"/>
+          <a:blip xmlns:r="http://schemas.openxmlformats.org/officeDocument/2006/relationships" xmlns:a="http://schemas.openxmlformats.org/drawingml/2006/main" r:embed="imgId44310880"/>
           <a:stretch xmlns:a="http://schemas.openxmlformats.org/drawingml/2006/main">
             <a:fillRect/>
           </a:stretch>
@@ -6789,7 +6789,7 @@
           <p:nvPr/>
         </p:nvPicPr>
         <p:blipFill>
-          <a:blip xmlns:r="http://schemas.openxmlformats.org/officeDocument/2006/relationships" xmlns:a="http://schemas.openxmlformats.org/drawingml/2006/main" r:embed="imgId44303179"/>
+          <a:blip xmlns:r="http://schemas.openxmlformats.org/officeDocument/2006/relationships" xmlns:a="http://schemas.openxmlformats.org/drawingml/2006/main" r:embed="imgId44310881"/>
           <a:stretch xmlns:a="http://schemas.openxmlformats.org/drawingml/2006/main">
             <a:fillRect/>
           </a:stretch>
@@ -6855,7 +6855,7 @@
           <p:nvPr/>
         </p:nvPicPr>
         <p:blipFill>
-          <a:blip xmlns:r="http://schemas.openxmlformats.org/officeDocument/2006/relationships" xmlns:a="http://schemas.openxmlformats.org/drawingml/2006/main" r:embed="imgId44303180"/>
+          <a:blip xmlns:r="http://schemas.openxmlformats.org/officeDocument/2006/relationships" xmlns:a="http://schemas.openxmlformats.org/drawingml/2006/main" r:embed="imgId44310882"/>
           <a:stretch xmlns:a="http://schemas.openxmlformats.org/drawingml/2006/main">
             <a:fillRect/>
           </a:stretch>
@@ -6921,7 +6921,7 @@
           <p:nvPr/>
         </p:nvPicPr>
         <p:blipFill>
-          <a:blip xmlns:r="http://schemas.openxmlformats.org/officeDocument/2006/relationships" xmlns:a="http://schemas.openxmlformats.org/drawingml/2006/main" r:embed="imgId44303181"/>
+          <a:blip xmlns:r="http://schemas.openxmlformats.org/officeDocument/2006/relationships" xmlns:a="http://schemas.openxmlformats.org/drawingml/2006/main" r:embed="imgId44310883"/>
           <a:stretch xmlns:a="http://schemas.openxmlformats.org/drawingml/2006/main">
             <a:fillRect/>
           </a:stretch>
@@ -6987,7 +6987,7 @@
           <p:nvPr/>
         </p:nvPicPr>
         <p:blipFill>
-          <a:blip xmlns:r="http://schemas.openxmlformats.org/officeDocument/2006/relationships" xmlns:a="http://schemas.openxmlformats.org/drawingml/2006/main" r:embed="imgId44303182"/>
+          <a:blip xmlns:r="http://schemas.openxmlformats.org/officeDocument/2006/relationships" xmlns:a="http://schemas.openxmlformats.org/drawingml/2006/main" r:embed="imgId44310884"/>
           <a:stretch xmlns:a="http://schemas.openxmlformats.org/drawingml/2006/main">
             <a:fillRect/>
           </a:stretch>
@@ -7053,7 +7053,7 @@
           <p:nvPr/>
         </p:nvPicPr>
         <p:blipFill>
-          <a:blip xmlns:r="http://schemas.openxmlformats.org/officeDocument/2006/relationships" xmlns:a="http://schemas.openxmlformats.org/drawingml/2006/main" r:embed="imgId44303183"/>
+          <a:blip xmlns:r="http://schemas.openxmlformats.org/officeDocument/2006/relationships" xmlns:a="http://schemas.openxmlformats.org/drawingml/2006/main" r:embed="imgId44310885"/>
           <a:stretch xmlns:a="http://schemas.openxmlformats.org/drawingml/2006/main">
             <a:fillRect/>
           </a:stretch>
@@ -7119,7 +7119,7 @@
           <p:nvPr/>
         </p:nvPicPr>
         <p:blipFill>
-          <a:blip xmlns:r="http://schemas.openxmlformats.org/officeDocument/2006/relationships" xmlns:a="http://schemas.openxmlformats.org/drawingml/2006/main" r:embed="imgId44303184"/>
+          <a:blip xmlns:r="http://schemas.openxmlformats.org/officeDocument/2006/relationships" xmlns:a="http://schemas.openxmlformats.org/drawingml/2006/main" r:embed="imgId44310886"/>
           <a:stretch xmlns:a="http://schemas.openxmlformats.org/drawingml/2006/main">
             <a:fillRect/>
           </a:stretch>

</xml_diff>